<commit_message>
almost done with F2024
</commit_message>
<xml_diff>
--- a/Slides/PH223_Lecture_15.pptx
+++ b/Slides/PH223_Lecture_15.pptx
@@ -166,7 +166,7 @@
 <file path=ppt/revisionInfo.xml><?xml version="1.0" encoding="utf-8"?>
 <p1510:revInfo xmlns:a="http://schemas.openxmlformats.org/drawingml/2006/main" xmlns:r="http://schemas.openxmlformats.org/officeDocument/2006/relationships" xmlns:p1510="http://schemas.microsoft.com/office/powerpoint/2015/10/main">
   <p1510:revLst>
-    <p1510:client id="{94697C76-E218-456D-AEA0-211C42FA23B6}" v="1" dt="2024-05-14T16:43:02.297"/>
+    <p1510:client id="{5BC0871A-774D-4453-B8B4-AFA9AAB67B99}" v="1" dt="2024-11-27T21:04:07.590"/>
   </p1510:revLst>
 </p1510:revInfo>
 </file>
@@ -762,6 +762,30 @@
       </pc:sldChg>
     </pc:docChg>
   </pc:docChgLst>
+  <pc:docChgLst>
+    <pc:chgData name="Lines, Todd" userId="afaf7c3a-e8aa-4568-882a-02ad8f9e19b0" providerId="ADAL" clId="{5BC0871A-774D-4453-B8B4-AFA9AAB67B99}"/>
+    <pc:docChg chg="custSel modSld">
+      <pc:chgData name="Lines, Todd" userId="afaf7c3a-e8aa-4568-882a-02ad8f9e19b0" providerId="ADAL" clId="{5BC0871A-774D-4453-B8B4-AFA9AAB67B99}" dt="2024-11-27T21:04:12.093" v="1" actId="21"/>
+      <pc:docMkLst>
+        <pc:docMk/>
+      </pc:docMkLst>
+      <pc:sldChg chg="delSp modSp mod">
+        <pc:chgData name="Lines, Todd" userId="afaf7c3a-e8aa-4568-882a-02ad8f9e19b0" providerId="ADAL" clId="{5BC0871A-774D-4453-B8B4-AFA9AAB67B99}" dt="2024-11-27T21:04:12.093" v="1" actId="21"/>
+        <pc:sldMkLst>
+          <pc:docMk/>
+          <pc:sldMk cId="0" sldId="261"/>
+        </pc:sldMkLst>
+        <pc:picChg chg="del mod">
+          <ac:chgData name="Lines, Todd" userId="afaf7c3a-e8aa-4568-882a-02ad8f9e19b0" providerId="ADAL" clId="{5BC0871A-774D-4453-B8B4-AFA9AAB67B99}" dt="2024-11-27T21:04:12.093" v="1" actId="21"/>
+          <ac:picMkLst>
+            <pc:docMk/>
+            <pc:sldMk cId="0" sldId="261"/>
+            <ac:picMk id="2" creationId="{D33DA90B-A3C7-4EB4-F703-28389D3312CF}"/>
+          </ac:picMkLst>
+        </pc:picChg>
+      </pc:sldChg>
+    </pc:docChg>
+  </pc:docChgLst>
 </pc:chgInfo>
 </file>
 
@@ -945,7 +969,7 @@
             <a:fld id="{EFBB5B7A-3EC1-4CBC-A1FD-4B8F1F44BB01}" type="datetimeFigureOut">
               <a:rPr lang="en-US" smtClean="0"/>
               <a:pPr/>
-              <a:t>5/14/2024</a:t>
+              <a:t>11/27/2024</a:t>
             </a:fld>
             <a:endParaRPr lang="en-US"/>
           </a:p>
@@ -1110,7 +1134,7 @@
             <a:fld id="{EFBB5B7A-3EC1-4CBC-A1FD-4B8F1F44BB01}" type="datetimeFigureOut">
               <a:rPr lang="en-US" smtClean="0"/>
               <a:pPr/>
-              <a:t>5/14/2024</a:t>
+              <a:t>11/27/2024</a:t>
             </a:fld>
             <a:endParaRPr lang="en-US"/>
           </a:p>
@@ -1285,7 +1309,7 @@
             <a:fld id="{EFBB5B7A-3EC1-4CBC-A1FD-4B8F1F44BB01}" type="datetimeFigureOut">
               <a:rPr lang="en-US" smtClean="0"/>
               <a:pPr/>
-              <a:t>5/14/2024</a:t>
+              <a:t>11/27/2024</a:t>
             </a:fld>
             <a:endParaRPr lang="en-US"/>
           </a:p>
@@ -1711,7 +1735,7 @@
             <a:fld id="{EFBB5B7A-3EC1-4CBC-A1FD-4B8F1F44BB01}" type="datetimeFigureOut">
               <a:rPr lang="en-US" smtClean="0"/>
               <a:pPr/>
-              <a:t>5/14/2024</a:t>
+              <a:t>11/27/2024</a:t>
             </a:fld>
             <a:endParaRPr lang="en-US"/>
           </a:p>
@@ -1953,7 +1977,7 @@
             <a:fld id="{EFBB5B7A-3EC1-4CBC-A1FD-4B8F1F44BB01}" type="datetimeFigureOut">
               <a:rPr lang="en-US" smtClean="0"/>
               <a:pPr/>
-              <a:t>5/14/2024</a:t>
+              <a:t>11/27/2024</a:t>
             </a:fld>
             <a:endParaRPr lang="en-US"/>
           </a:p>
@@ -2235,7 +2259,7 @@
             <a:fld id="{EFBB5B7A-3EC1-4CBC-A1FD-4B8F1F44BB01}" type="datetimeFigureOut">
               <a:rPr lang="en-US" smtClean="0"/>
               <a:pPr/>
-              <a:t>5/14/2024</a:t>
+              <a:t>11/27/2024</a:t>
             </a:fld>
             <a:endParaRPr lang="en-US"/>
           </a:p>
@@ -2651,7 +2675,7 @@
             <a:fld id="{EFBB5B7A-3EC1-4CBC-A1FD-4B8F1F44BB01}" type="datetimeFigureOut">
               <a:rPr lang="en-US" smtClean="0"/>
               <a:pPr/>
-              <a:t>5/14/2024</a:t>
+              <a:t>11/27/2024</a:t>
             </a:fld>
             <a:endParaRPr lang="en-US"/>
           </a:p>
@@ -2765,7 +2789,7 @@
             <a:fld id="{EFBB5B7A-3EC1-4CBC-A1FD-4B8F1F44BB01}" type="datetimeFigureOut">
               <a:rPr lang="en-US" smtClean="0"/>
               <a:pPr/>
-              <a:t>5/14/2024</a:t>
+              <a:t>11/27/2024</a:t>
             </a:fld>
             <a:endParaRPr lang="en-US"/>
           </a:p>
@@ -2857,7 +2881,7 @@
             <a:fld id="{EFBB5B7A-3EC1-4CBC-A1FD-4B8F1F44BB01}" type="datetimeFigureOut">
               <a:rPr lang="en-US" smtClean="0"/>
               <a:pPr/>
-              <a:t>5/14/2024</a:t>
+              <a:t>11/27/2024</a:t>
             </a:fld>
             <a:endParaRPr lang="en-US"/>
           </a:p>
@@ -3129,7 +3153,7 @@
             <a:fld id="{EFBB5B7A-3EC1-4CBC-A1FD-4B8F1F44BB01}" type="datetimeFigureOut">
               <a:rPr lang="en-US" smtClean="0"/>
               <a:pPr/>
-              <a:t>5/14/2024</a:t>
+              <a:t>11/27/2024</a:t>
             </a:fld>
             <a:endParaRPr lang="en-US"/>
           </a:p>
@@ -3378,7 +3402,7 @@
             <a:fld id="{EFBB5B7A-3EC1-4CBC-A1FD-4B8F1F44BB01}" type="datetimeFigureOut">
               <a:rPr lang="en-US" smtClean="0"/>
               <a:pPr/>
-              <a:t>5/14/2024</a:t>
+              <a:t>11/27/2024</a:t>
             </a:fld>
             <a:endParaRPr lang="en-US"/>
           </a:p>
@@ -3586,7 +3610,7 @@
             <a:fld id="{EFBB5B7A-3EC1-4CBC-A1FD-4B8F1F44BB01}" type="datetimeFigureOut">
               <a:rPr lang="en-US" smtClean="0"/>
               <a:pPr/>
-              <a:t>5/14/2024</a:t>
+              <a:t>11/27/2024</a:t>
             </a:fld>
             <a:endParaRPr lang="en-US"/>
           </a:p>

</xml_diff>